<commit_message>
oox smartart, org chart: handle multiple elements in hierChild
In case one manager has multiple employees, then we laid out only the
first one. Recognize non-assistant type as the node type (as a start) to
get the correct number of employees (when there are no assistants), and
also render employees on a horizontal (and not on a vertical) path.

With this, the 1 manager and multiple employees case looks reasonable.

Change-Id: I3bbe0413586b1a2c25f9094dbd44f1a86c799c0f
Reviewed-on: https://gerrit.libreoffice.org/65813
Reviewed-by: Miklos Vajna <vmiklos@collabora.com>
Tested-by: Jenkins
</commit_message>
<xml_diff>
--- a/sd/qa/unit/data/pptx/smartart-org-chart.pptx
+++ b/sd/qa/unit/data/pptx/smartart-org-chart.pptx
@@ -942,6 +942,43 @@
         </a:p>
       </dgm:t>
     </dgm:pt>
+    <dgm:pt modelId="{EE8A25CC-646E-4C3E-A390-0945F2BDB392}">
+      <dgm:prSet phldrT="[Text]"/>
+      <dgm:spPr/>
+      <dgm:t>
+        <a:bodyPr/>
+        <a:lstStyle/>
+        <a:p>
+          <a:r>
+            <a:rPr lang="en-US" dirty="0" smtClean="0"/>
+            <a:t>Employee2</a:t>
+          </a:r>
+          <a:endParaRPr lang="en-US" dirty="0"/>
+        </a:p>
+      </dgm:t>
+    </dgm:pt>
+    <dgm:pt modelId="{F24B68E4-F207-4331-AB2E-874EF6376E5A}" type="parTrans" cxnId="{7D12767F-1F85-4A68-A5EA-692214E31832}">
+      <dgm:prSet/>
+      <dgm:spPr/>
+      <dgm:t>
+        <a:bodyPr/>
+        <a:lstStyle/>
+        <a:p>
+          <a:endParaRPr lang="en-US"/>
+        </a:p>
+      </dgm:t>
+    </dgm:pt>
+    <dgm:pt modelId="{C0963BE2-9AA3-4137-9EAC-5EB96AB269CB}" type="sibTrans" cxnId="{7D12767F-1F85-4A68-A5EA-692214E31832}">
+      <dgm:prSet/>
+      <dgm:spPr/>
+      <dgm:t>
+        <a:bodyPr/>
+        <a:lstStyle/>
+        <a:p>
+          <a:endParaRPr lang="en-US"/>
+        </a:p>
+      </dgm:t>
+    </dgm:pt>
     <dgm:pt modelId="{1E6CC110-7E98-4D6E-866F-F1D76D73F529}" type="pres">
       <dgm:prSet presAssocID="{E91F32F3-B4D2-4874-B7C8-B38898C3429E}" presName="hierChild1" presStyleCnt="0">
         <dgm:presLayoutVars>
@@ -954,6 +991,13 @@
         </dgm:presLayoutVars>
       </dgm:prSet>
       <dgm:spPr/>
+      <dgm:t>
+        <a:bodyPr/>
+        <a:lstStyle/>
+        <a:p>
+          <a:endParaRPr lang="en-US"/>
+        </a:p>
+      </dgm:t>
     </dgm:pt>
     <dgm:pt modelId="{C035F02F-130B-4526-B8E1-EBEE23F5E756}" type="pres">
       <dgm:prSet presAssocID="{F79BF2BA-C12D-41F0-98AB-ECF0687C8930}" presName="hierRoot1" presStyleCnt="0">
@@ -974,18 +1018,39 @@
         </dgm:presLayoutVars>
       </dgm:prSet>
       <dgm:spPr/>
+      <dgm:t>
+        <a:bodyPr/>
+        <a:lstStyle/>
+        <a:p>
+          <a:endParaRPr lang="en-US"/>
+        </a:p>
+      </dgm:t>
     </dgm:pt>
     <dgm:pt modelId="{8C013EB3-B4D3-4529-902A-AD72844806A5}" type="pres">
       <dgm:prSet presAssocID="{F79BF2BA-C12D-41F0-98AB-ECF0687C8930}" presName="rootConnector1" presStyleLbl="node1" presStyleIdx="0" presStyleCnt="0"/>
       <dgm:spPr/>
+      <dgm:t>
+        <a:bodyPr/>
+        <a:lstStyle/>
+        <a:p>
+          <a:endParaRPr lang="en-US"/>
+        </a:p>
+      </dgm:t>
     </dgm:pt>
     <dgm:pt modelId="{FC88DCD2-EE25-4A7C-B113-4C0DE038DFC3}" type="pres">
       <dgm:prSet presAssocID="{F79BF2BA-C12D-41F0-98AB-ECF0687C8930}" presName="hierChild2" presStyleCnt="0"/>
       <dgm:spPr/>
     </dgm:pt>
     <dgm:pt modelId="{888DEA80-633D-4A41-962C-40328E175584}" type="pres">
-      <dgm:prSet presAssocID="{FD244A27-16C9-4184-91E5-921C7737C3A4}" presName="Name37" presStyleLbl="parChTrans1D2" presStyleIdx="0" presStyleCnt="1"/>
+      <dgm:prSet presAssocID="{FD244A27-16C9-4184-91E5-921C7737C3A4}" presName="Name37" presStyleLbl="parChTrans1D2" presStyleIdx="0" presStyleCnt="2"/>
       <dgm:spPr/>
+      <dgm:t>
+        <a:bodyPr/>
+        <a:lstStyle/>
+        <a:p>
+          <a:endParaRPr lang="en-US"/>
+        </a:p>
+      </dgm:t>
     </dgm:pt>
     <dgm:pt modelId="{176741BD-D697-4776-886B-00AB96CA6F47}" type="pres">
       <dgm:prSet presAssocID="{4C56CC9F-0CFC-4191-B98C-D01C5D04FD77}" presName="hierRoot2" presStyleCnt="0">
@@ -1000,7 +1065,7 @@
       <dgm:spPr/>
     </dgm:pt>
     <dgm:pt modelId="{8AF25BAC-ACA9-4D18-8F24-F17D21F7278E}" type="pres">
-      <dgm:prSet presAssocID="{4C56CC9F-0CFC-4191-B98C-D01C5D04FD77}" presName="rootText" presStyleLbl="node2" presStyleIdx="0" presStyleCnt="1">
+      <dgm:prSet presAssocID="{4C56CC9F-0CFC-4191-B98C-D01C5D04FD77}" presName="rootText" presStyleLbl="node2" presStyleIdx="0" presStyleCnt="2">
         <dgm:presLayoutVars>
           <dgm:chPref val="3"/>
         </dgm:presLayoutVars>
@@ -1015,8 +1080,15 @@
       </dgm:t>
     </dgm:pt>
     <dgm:pt modelId="{4A9BCEEC-BFD4-44F8-A47B-C443FDAFA94F}" type="pres">
-      <dgm:prSet presAssocID="{4C56CC9F-0CFC-4191-B98C-D01C5D04FD77}" presName="rootConnector" presStyleLbl="node2" presStyleIdx="0" presStyleCnt="1"/>
+      <dgm:prSet presAssocID="{4C56CC9F-0CFC-4191-B98C-D01C5D04FD77}" presName="rootConnector" presStyleLbl="node2" presStyleIdx="0" presStyleCnt="2"/>
       <dgm:spPr/>
+      <dgm:t>
+        <a:bodyPr/>
+        <a:lstStyle/>
+        <a:p>
+          <a:endParaRPr lang="en-US"/>
+        </a:p>
+      </dgm:t>
     </dgm:pt>
     <dgm:pt modelId="{8B613D6F-A3C0-42B8-B707-3851C9911925}" type="pres">
       <dgm:prSet presAssocID="{4C56CC9F-0CFC-4191-B98C-D01C5D04FD77}" presName="hierChild4" presStyleCnt="0"/>
@@ -1026,6 +1098,56 @@
       <dgm:prSet presAssocID="{4C56CC9F-0CFC-4191-B98C-D01C5D04FD77}" presName="hierChild5" presStyleCnt="0"/>
       <dgm:spPr/>
     </dgm:pt>
+    <dgm:pt modelId="{8FD8BB2B-E817-456B-BC2C-6ABA570D34B2}" type="pres">
+      <dgm:prSet presAssocID="{F24B68E4-F207-4331-AB2E-874EF6376E5A}" presName="Name37" presStyleLbl="parChTrans1D2" presStyleIdx="1" presStyleCnt="2"/>
+      <dgm:spPr/>
+    </dgm:pt>
+    <dgm:pt modelId="{8359BC8A-F4E4-479E-BB7B-CDBBAD8A1571}" type="pres">
+      <dgm:prSet presAssocID="{EE8A25CC-646E-4C3E-A390-0945F2BDB392}" presName="hierRoot2" presStyleCnt="0">
+        <dgm:presLayoutVars>
+          <dgm:hierBranch val="init"/>
+        </dgm:presLayoutVars>
+      </dgm:prSet>
+      <dgm:spPr/>
+    </dgm:pt>
+    <dgm:pt modelId="{B8DA2E91-40EA-4357-9066-DF02F6F0D640}" type="pres">
+      <dgm:prSet presAssocID="{EE8A25CC-646E-4C3E-A390-0945F2BDB392}" presName="rootComposite" presStyleCnt="0"/>
+      <dgm:spPr/>
+    </dgm:pt>
+    <dgm:pt modelId="{3F56B7B4-3052-4B04-B64B-053E097390D2}" type="pres">
+      <dgm:prSet presAssocID="{EE8A25CC-646E-4C3E-A390-0945F2BDB392}" presName="rootText" presStyleLbl="node2" presStyleIdx="1" presStyleCnt="2">
+        <dgm:presLayoutVars>
+          <dgm:chPref val="3"/>
+        </dgm:presLayoutVars>
+      </dgm:prSet>
+      <dgm:spPr/>
+      <dgm:t>
+        <a:bodyPr/>
+        <a:lstStyle/>
+        <a:p>
+          <a:endParaRPr lang="en-US"/>
+        </a:p>
+      </dgm:t>
+    </dgm:pt>
+    <dgm:pt modelId="{61D0F5EB-FA81-4C71-9EE2-9B02E7B657D0}" type="pres">
+      <dgm:prSet presAssocID="{EE8A25CC-646E-4C3E-A390-0945F2BDB392}" presName="rootConnector" presStyleLbl="node2" presStyleIdx="1" presStyleCnt="2"/>
+      <dgm:spPr/>
+      <dgm:t>
+        <a:bodyPr/>
+        <a:lstStyle/>
+        <a:p>
+          <a:endParaRPr lang="en-US"/>
+        </a:p>
+      </dgm:t>
+    </dgm:pt>
+    <dgm:pt modelId="{CC512F7B-0B78-43DE-A5DC-F70D378F3571}" type="pres">
+      <dgm:prSet presAssocID="{EE8A25CC-646E-4C3E-A390-0945F2BDB392}" presName="hierChild4" presStyleCnt="0"/>
+      <dgm:spPr/>
+    </dgm:pt>
+    <dgm:pt modelId="{686F3B19-B76D-48BC-B83C-849E1E4EFD92}" type="pres">
+      <dgm:prSet presAssocID="{EE8A25CC-646E-4C3E-A390-0945F2BDB392}" presName="hierChild5" presStyleCnt="0"/>
+      <dgm:spPr/>
+    </dgm:pt>
     <dgm:pt modelId="{E3D4090F-A76A-4060-BA3B-7C835CB9379A}" type="pres">
       <dgm:prSet presAssocID="{F79BF2BA-C12D-41F0-98AB-ECF0687C8930}" presName="hierChild3" presStyleCnt="0"/>
       <dgm:spPr/>
@@ -1033,13 +1155,17 @@
   </dgm:ptLst>
   <dgm:cxnLst>
     <dgm:cxn modelId="{E80C2B05-DD61-472D-BB38-D1C42AC173C2}" type="presOf" srcId="{E91F32F3-B4D2-4874-B7C8-B38898C3429E}" destId="{1E6CC110-7E98-4D6E-866F-F1D76D73F529}" srcOrd="0" destOrd="0" presId="urn:microsoft.com/office/officeart/2005/8/layout/orgChart1"/>
+    <dgm:cxn modelId="{D16D6771-BF0B-460F-BC67-271464CD097B}" type="presOf" srcId="{F79BF2BA-C12D-41F0-98AB-ECF0687C8930}" destId="{8C013EB3-B4D3-4529-902A-AD72844806A5}" srcOrd="1" destOrd="0" presId="urn:microsoft.com/office/officeart/2005/8/layout/orgChart1"/>
     <dgm:cxn modelId="{4961BDC5-724B-4CD5-B550-38AA49D4F23C}" srcId="{F79BF2BA-C12D-41F0-98AB-ECF0687C8930}" destId="{4C56CC9F-0CFC-4191-B98C-D01C5D04FD77}" srcOrd="0" destOrd="0" parTransId="{FD244A27-16C9-4184-91E5-921C7737C3A4}" sibTransId="{D8D65D54-A0CA-4F3D-BF9F-0D6998BAA758}"/>
+    <dgm:cxn modelId="{4A761667-AD16-4924-8990-C26FEAF32E50}" type="presOf" srcId="{4C56CC9F-0CFC-4191-B98C-D01C5D04FD77}" destId="{8AF25BAC-ACA9-4D18-8F24-F17D21F7278E}" srcOrd="0" destOrd="0" presId="urn:microsoft.com/office/officeart/2005/8/layout/orgChart1"/>
+    <dgm:cxn modelId="{27FA029E-098A-48CC-AD7B-327E28479C76}" type="presOf" srcId="{F24B68E4-F207-4331-AB2E-874EF6376E5A}" destId="{8FD8BB2B-E817-456B-BC2C-6ABA570D34B2}" srcOrd="0" destOrd="0" presId="urn:microsoft.com/office/officeart/2005/8/layout/orgChart1"/>
+    <dgm:cxn modelId="{8B8316E3-C488-44AA-8207-C2C2F9C8D7E3}" type="presOf" srcId="{F79BF2BA-C12D-41F0-98AB-ECF0687C8930}" destId="{73D75FC9-4D0B-4F1C-9DAF-025710BC7780}" srcOrd="0" destOrd="0" presId="urn:microsoft.com/office/officeart/2005/8/layout/orgChart1"/>
+    <dgm:cxn modelId="{23955F49-FB11-4B92-B7A7-EED9CEEE5367}" srcId="{E91F32F3-B4D2-4874-B7C8-B38898C3429E}" destId="{F79BF2BA-C12D-41F0-98AB-ECF0687C8930}" srcOrd="0" destOrd="0" parTransId="{5C706A80-9F77-435D-9A81-12AE85E9301B}" sibTransId="{C96AB820-3048-4232-AAB2-0139EC082F34}"/>
+    <dgm:cxn modelId="{A9FD64E2-868E-47A9-85B3-33D3CAD7C56A}" type="presOf" srcId="{EE8A25CC-646E-4C3E-A390-0945F2BDB392}" destId="{61D0F5EB-FA81-4C71-9EE2-9B02E7B657D0}" srcOrd="1" destOrd="0" presId="urn:microsoft.com/office/officeart/2005/8/layout/orgChart1"/>
+    <dgm:cxn modelId="{B7BCE250-A52E-4969-8832-FCE7E074DA94}" type="presOf" srcId="{EE8A25CC-646E-4C3E-A390-0945F2BDB392}" destId="{3F56B7B4-3052-4B04-B64B-053E097390D2}" srcOrd="0" destOrd="0" presId="urn:microsoft.com/office/officeart/2005/8/layout/orgChart1"/>
     <dgm:cxn modelId="{69145F54-5A4D-493E-A4FE-C96742CE171F}" type="presOf" srcId="{4C56CC9F-0CFC-4191-B98C-D01C5D04FD77}" destId="{4A9BCEEC-BFD4-44F8-A47B-C443FDAFA94F}" srcOrd="1" destOrd="0" presId="urn:microsoft.com/office/officeart/2005/8/layout/orgChart1"/>
-    <dgm:cxn modelId="{D16D6771-BF0B-460F-BC67-271464CD097B}" type="presOf" srcId="{F79BF2BA-C12D-41F0-98AB-ECF0687C8930}" destId="{8C013EB3-B4D3-4529-902A-AD72844806A5}" srcOrd="1" destOrd="0" presId="urn:microsoft.com/office/officeart/2005/8/layout/orgChart1"/>
-    <dgm:cxn modelId="{4A761667-AD16-4924-8990-C26FEAF32E50}" type="presOf" srcId="{4C56CC9F-0CFC-4191-B98C-D01C5D04FD77}" destId="{8AF25BAC-ACA9-4D18-8F24-F17D21F7278E}" srcOrd="0" destOrd="0" presId="urn:microsoft.com/office/officeart/2005/8/layout/orgChart1"/>
     <dgm:cxn modelId="{5455AA16-A42E-4F1E-B42B-2BCD519F7C5D}" type="presOf" srcId="{FD244A27-16C9-4184-91E5-921C7737C3A4}" destId="{888DEA80-633D-4A41-962C-40328E175584}" srcOrd="0" destOrd="0" presId="urn:microsoft.com/office/officeart/2005/8/layout/orgChart1"/>
-    <dgm:cxn modelId="{23955F49-FB11-4B92-B7A7-EED9CEEE5367}" srcId="{E91F32F3-B4D2-4874-B7C8-B38898C3429E}" destId="{F79BF2BA-C12D-41F0-98AB-ECF0687C8930}" srcOrd="0" destOrd="0" parTransId="{5C706A80-9F77-435D-9A81-12AE85E9301B}" sibTransId="{C96AB820-3048-4232-AAB2-0139EC082F34}"/>
-    <dgm:cxn modelId="{8B8316E3-C488-44AA-8207-C2C2F9C8D7E3}" type="presOf" srcId="{F79BF2BA-C12D-41F0-98AB-ECF0687C8930}" destId="{73D75FC9-4D0B-4F1C-9DAF-025710BC7780}" srcOrd="0" destOrd="0" presId="urn:microsoft.com/office/officeart/2005/8/layout/orgChart1"/>
+    <dgm:cxn modelId="{7D12767F-1F85-4A68-A5EA-692214E31832}" srcId="{F79BF2BA-C12D-41F0-98AB-ECF0687C8930}" destId="{EE8A25CC-646E-4C3E-A390-0945F2BDB392}" srcOrd="1" destOrd="0" parTransId="{F24B68E4-F207-4331-AB2E-874EF6376E5A}" sibTransId="{C0963BE2-9AA3-4137-9EAC-5EB96AB269CB}"/>
     <dgm:cxn modelId="{E46154BD-36B9-4EA4-893D-2FFA45E2C50D}" type="presParOf" srcId="{1E6CC110-7E98-4D6E-866F-F1D76D73F529}" destId="{C035F02F-130B-4526-B8E1-EBEE23F5E756}" srcOrd="0" destOrd="0" presId="urn:microsoft.com/office/officeart/2005/8/layout/orgChart1"/>
     <dgm:cxn modelId="{2104D806-AB15-467F-965D-8AD0128ECCB0}" type="presParOf" srcId="{C035F02F-130B-4526-B8E1-EBEE23F5E756}" destId="{47BE8FF0-8C79-4F27-B3E2-1AA358354832}" srcOrd="0" destOrd="0" presId="urn:microsoft.com/office/officeart/2005/8/layout/orgChart1"/>
     <dgm:cxn modelId="{BE951806-9A6E-42E2-BA02-15FE7B420B92}" type="presParOf" srcId="{47BE8FF0-8C79-4F27-B3E2-1AA358354832}" destId="{73D75FC9-4D0B-4F1C-9DAF-025710BC7780}" srcOrd="0" destOrd="0" presId="urn:microsoft.com/office/officeart/2005/8/layout/orgChart1"/>
@@ -1052,6 +1178,13 @@
     <dgm:cxn modelId="{A6188B4E-9C7D-469C-AA05-6F58DB87A0BC}" type="presParOf" srcId="{673B6CAD-814D-4DDB-BC69-C05BD8A5E13A}" destId="{4A9BCEEC-BFD4-44F8-A47B-C443FDAFA94F}" srcOrd="1" destOrd="0" presId="urn:microsoft.com/office/officeart/2005/8/layout/orgChart1"/>
     <dgm:cxn modelId="{38FFB877-68C9-44E5-90B0-6BFA67090012}" type="presParOf" srcId="{176741BD-D697-4776-886B-00AB96CA6F47}" destId="{8B613D6F-A3C0-42B8-B707-3851C9911925}" srcOrd="1" destOrd="0" presId="urn:microsoft.com/office/officeart/2005/8/layout/orgChart1"/>
     <dgm:cxn modelId="{30649ADD-8069-40A7-B12C-FB9DD025746F}" type="presParOf" srcId="{176741BD-D697-4776-886B-00AB96CA6F47}" destId="{5A092A9E-4884-4B0A-9BD8-4C23A37E2695}" srcOrd="2" destOrd="0" presId="urn:microsoft.com/office/officeart/2005/8/layout/orgChart1"/>
+    <dgm:cxn modelId="{29901157-CB09-4CA6-B8A0-BF2BCEC35391}" type="presParOf" srcId="{FC88DCD2-EE25-4A7C-B113-4C0DE038DFC3}" destId="{8FD8BB2B-E817-456B-BC2C-6ABA570D34B2}" srcOrd="2" destOrd="0" presId="urn:microsoft.com/office/officeart/2005/8/layout/orgChart1"/>
+    <dgm:cxn modelId="{9BF52E0D-95CA-49EE-AE9B-9110E6415275}" type="presParOf" srcId="{FC88DCD2-EE25-4A7C-B113-4C0DE038DFC3}" destId="{8359BC8A-F4E4-479E-BB7B-CDBBAD8A1571}" srcOrd="3" destOrd="0" presId="urn:microsoft.com/office/officeart/2005/8/layout/orgChart1"/>
+    <dgm:cxn modelId="{591EC8DC-0A55-4387-BA88-45E2353C13BD}" type="presParOf" srcId="{8359BC8A-F4E4-479E-BB7B-CDBBAD8A1571}" destId="{B8DA2E91-40EA-4357-9066-DF02F6F0D640}" srcOrd="0" destOrd="0" presId="urn:microsoft.com/office/officeart/2005/8/layout/orgChart1"/>
+    <dgm:cxn modelId="{F63FA7CF-6CB9-4D63-86FA-32F976CFCA45}" type="presParOf" srcId="{B8DA2E91-40EA-4357-9066-DF02F6F0D640}" destId="{3F56B7B4-3052-4B04-B64B-053E097390D2}" srcOrd="0" destOrd="0" presId="urn:microsoft.com/office/officeart/2005/8/layout/orgChart1"/>
+    <dgm:cxn modelId="{0DD836B6-64EE-4051-9A60-38E6C62CDF4D}" type="presParOf" srcId="{B8DA2E91-40EA-4357-9066-DF02F6F0D640}" destId="{61D0F5EB-FA81-4C71-9EE2-9B02E7B657D0}" srcOrd="1" destOrd="0" presId="urn:microsoft.com/office/officeart/2005/8/layout/orgChart1"/>
+    <dgm:cxn modelId="{C84B8199-AA92-4DF3-BE53-5B4049B2875E}" type="presParOf" srcId="{8359BC8A-F4E4-479E-BB7B-CDBBAD8A1571}" destId="{CC512F7B-0B78-43DE-A5DC-F70D378F3571}" srcOrd="1" destOrd="0" presId="urn:microsoft.com/office/officeart/2005/8/layout/orgChart1"/>
+    <dgm:cxn modelId="{1B9A340F-A352-44C3-90CD-9F181CA4F930}" type="presParOf" srcId="{8359BC8A-F4E4-479E-BB7B-CDBBAD8A1571}" destId="{686F3B19-B76D-48BC-B83C-849E1E4EFD92}" srcOrd="2" destOrd="0" presId="urn:microsoft.com/office/officeart/2005/8/layout/orgChart1"/>
     <dgm:cxn modelId="{74C65238-4EF9-4BD6-90F4-72BE7F74FC01}" type="presParOf" srcId="{C035F02F-130B-4526-B8E1-EBEE23F5E756}" destId="{E3D4090F-A76A-4060-BA3B-7C835CB9379A}" srcOrd="2" destOrd="0" presId="urn:microsoft.com/office/officeart/2005/8/layout/orgChart1"/>
   </dgm:cxnLst>
   <dgm:bg/>
@@ -3437,7 +3570,7 @@
           <a:p>
             <a:fld id="{15E12F17-D344-4B5E-8FF6-E09E5B6DEAF0}" type="datetimeFigureOut">
               <a:rPr lang="en-US" smtClean="0"/>
-              <a:t>12/21/2018</a:t>
+              <a:t>1/2/2019</a:t>
             </a:fld>
             <a:endParaRPr lang="en-US"/>
           </a:p>
@@ -3607,7 +3740,7 @@
           <a:p>
             <a:fld id="{15E12F17-D344-4B5E-8FF6-E09E5B6DEAF0}" type="datetimeFigureOut">
               <a:rPr lang="en-US" smtClean="0"/>
-              <a:t>12/21/2018</a:t>
+              <a:t>1/2/2019</a:t>
             </a:fld>
             <a:endParaRPr lang="en-US"/>
           </a:p>
@@ -3787,7 +3920,7 @@
           <a:p>
             <a:fld id="{15E12F17-D344-4B5E-8FF6-E09E5B6DEAF0}" type="datetimeFigureOut">
               <a:rPr lang="en-US" smtClean="0"/>
-              <a:t>12/21/2018</a:t>
+              <a:t>1/2/2019</a:t>
             </a:fld>
             <a:endParaRPr lang="en-US"/>
           </a:p>
@@ -3957,7 +4090,7 @@
           <a:p>
             <a:fld id="{15E12F17-D344-4B5E-8FF6-E09E5B6DEAF0}" type="datetimeFigureOut">
               <a:rPr lang="en-US" smtClean="0"/>
-              <a:t>12/21/2018</a:t>
+              <a:t>1/2/2019</a:t>
             </a:fld>
             <a:endParaRPr lang="en-US"/>
           </a:p>
@@ -4203,7 +4336,7 @@
           <a:p>
             <a:fld id="{15E12F17-D344-4B5E-8FF6-E09E5B6DEAF0}" type="datetimeFigureOut">
               <a:rPr lang="en-US" smtClean="0"/>
-              <a:t>12/21/2018</a:t>
+              <a:t>1/2/2019</a:t>
             </a:fld>
             <a:endParaRPr lang="en-US"/>
           </a:p>
@@ -4491,7 +4624,7 @@
           <a:p>
             <a:fld id="{15E12F17-D344-4B5E-8FF6-E09E5B6DEAF0}" type="datetimeFigureOut">
               <a:rPr lang="en-US" smtClean="0"/>
-              <a:t>12/21/2018</a:t>
+              <a:t>1/2/2019</a:t>
             </a:fld>
             <a:endParaRPr lang="en-US"/>
           </a:p>
@@ -4913,7 +5046,7 @@
           <a:p>
             <a:fld id="{15E12F17-D344-4B5E-8FF6-E09E5B6DEAF0}" type="datetimeFigureOut">
               <a:rPr lang="en-US" smtClean="0"/>
-              <a:t>12/21/2018</a:t>
+              <a:t>1/2/2019</a:t>
             </a:fld>
             <a:endParaRPr lang="en-US"/>
           </a:p>
@@ -5031,7 +5164,7 @@
           <a:p>
             <a:fld id="{15E12F17-D344-4B5E-8FF6-E09E5B6DEAF0}" type="datetimeFigureOut">
               <a:rPr lang="en-US" smtClean="0"/>
-              <a:t>12/21/2018</a:t>
+              <a:t>1/2/2019</a:t>
             </a:fld>
             <a:endParaRPr lang="en-US"/>
           </a:p>
@@ -5126,7 +5259,7 @@
           <a:p>
             <a:fld id="{15E12F17-D344-4B5E-8FF6-E09E5B6DEAF0}" type="datetimeFigureOut">
               <a:rPr lang="en-US" smtClean="0"/>
-              <a:t>12/21/2018</a:t>
+              <a:t>1/2/2019</a:t>
             </a:fld>
             <a:endParaRPr lang="en-US"/>
           </a:p>
@@ -5403,7 +5536,7 @@
           <a:p>
             <a:fld id="{15E12F17-D344-4B5E-8FF6-E09E5B6DEAF0}" type="datetimeFigureOut">
               <a:rPr lang="en-US" smtClean="0"/>
-              <a:t>12/21/2018</a:t>
+              <a:t>1/2/2019</a:t>
             </a:fld>
             <a:endParaRPr lang="en-US"/>
           </a:p>
@@ -5656,7 +5789,7 @@
           <a:p>
             <a:fld id="{15E12F17-D344-4B5E-8FF6-E09E5B6DEAF0}" type="datetimeFigureOut">
               <a:rPr lang="en-US" smtClean="0"/>
-              <a:t>12/21/2018</a:t>
+              <a:t>1/2/2019</a:t>
             </a:fld>
             <a:endParaRPr lang="en-US"/>
           </a:p>
@@ -5869,7 +6002,7 @@
           <a:p>
             <a:fld id="{15E12F17-D344-4B5E-8FF6-E09E5B6DEAF0}" type="datetimeFigureOut">
               <a:rPr lang="en-US" smtClean="0"/>
-              <a:t>12/21/2018</a:t>
+              <a:t>1/2/2019</a:t>
             </a:fld>
             <a:endParaRPr lang="en-US"/>
           </a:p>
@@ -6251,7 +6384,7 @@
           <p:nvPr>
             <p:extLst>
               <p:ext uri="{D42A27DB-BD31-4B8C-83A1-F6EECF244321}">
-                <p14:modId xmlns:p14="http://schemas.microsoft.com/office/powerpoint/2010/main" val="3440590601"/>
+                <p14:modId xmlns:p14="http://schemas.microsoft.com/office/powerpoint/2010/main" val="2363260824"/>
               </p:ext>
             </p:extLst>
           </p:nvPr>

</xml_diff>

<commit_message>
oox smartart, org chart: fix vertical order of assistant nodes
It seems the manager -> assistant -> employees ordering is not part of
the file format. The order is stored twice in the file: the hierRoot
algorithm has 3 layout nodes as a children, and also the data model has
an order of the presentation nodes: both describe that employees go
before assistant nodes.

In contrast to that, PowerPoint orders XML_asst nodes before XML_node
ones, so teach the hierRoot algorithm about this.

This requires tracking the data model node type for each in-diagram
drawingML shape, so that layout can determine if a hierRoot algorithm
children has an assistant node or not.

Change-Id: Ib81f3666fb092ed3b036d830f69ba7e1b94f8331
Reviewed-on: https://gerrit.libreoffice.org/66048
Reviewed-by: Miklos Vajna <vmiklos@collabora.com>
Tested-by: Jenkins
</commit_message>
<xml_diff>
--- a/sd/qa/unit/data/pptx/smartart-org-chart.pptx
+++ b/sd/qa/unit/data/pptx/smartart-org-chart.pptx
@@ -979,6 +979,43 @@
         </a:p>
       </dgm:t>
     </dgm:pt>
+    <dgm:pt modelId="{37895DD0-92FC-468C-926C-0EBA4D248FBF}" type="asst">
+      <dgm:prSet/>
+      <dgm:spPr/>
+      <dgm:t>
+        <a:bodyPr/>
+        <a:lstStyle/>
+        <a:p>
+          <a:r>
+            <a:rPr lang="en-US" dirty="0" smtClean="0"/>
+            <a:t>Assistant</a:t>
+          </a:r>
+          <a:endParaRPr lang="en-US" dirty="0"/>
+        </a:p>
+      </dgm:t>
+    </dgm:pt>
+    <dgm:pt modelId="{7696DB51-2E87-4A8F-9450-E2326826882E}" type="parTrans" cxnId="{4A9392B6-4EE8-4F51-9CCF-0142051C091F}">
+      <dgm:prSet/>
+      <dgm:spPr/>
+      <dgm:t>
+        <a:bodyPr/>
+        <a:lstStyle/>
+        <a:p>
+          <a:endParaRPr lang="en-US"/>
+        </a:p>
+      </dgm:t>
+    </dgm:pt>
+    <dgm:pt modelId="{7E3F9848-0627-4D4E-A984-297C8EB004FF}" type="sibTrans" cxnId="{4A9392B6-4EE8-4F51-9CCF-0142051C091F}">
+      <dgm:prSet/>
+      <dgm:spPr/>
+      <dgm:t>
+        <a:bodyPr/>
+        <a:lstStyle/>
+        <a:p>
+          <a:endParaRPr lang="en-US"/>
+        </a:p>
+      </dgm:t>
+    </dgm:pt>
     <dgm:pt modelId="{1E6CC110-7E98-4D6E-866F-F1D76D73F529}" type="pres">
       <dgm:prSet presAssocID="{E91F32F3-B4D2-4874-B7C8-B38898C3429E}" presName="hierChild1" presStyleCnt="0">
         <dgm:presLayoutVars>
@@ -1042,7 +1079,7 @@
       <dgm:spPr/>
     </dgm:pt>
     <dgm:pt modelId="{888DEA80-633D-4A41-962C-40328E175584}" type="pres">
-      <dgm:prSet presAssocID="{FD244A27-16C9-4184-91E5-921C7737C3A4}" presName="Name37" presStyleLbl="parChTrans1D2" presStyleIdx="0" presStyleCnt="2"/>
+      <dgm:prSet presAssocID="{FD244A27-16C9-4184-91E5-921C7737C3A4}" presName="Name37" presStyleLbl="parChTrans1D2" presStyleIdx="0" presStyleCnt="3"/>
       <dgm:spPr/>
       <dgm:t>
         <a:bodyPr/>
@@ -1099,8 +1136,15 @@
       <dgm:spPr/>
     </dgm:pt>
     <dgm:pt modelId="{8FD8BB2B-E817-456B-BC2C-6ABA570D34B2}" type="pres">
-      <dgm:prSet presAssocID="{F24B68E4-F207-4331-AB2E-874EF6376E5A}" presName="Name37" presStyleLbl="parChTrans1D2" presStyleIdx="1" presStyleCnt="2"/>
+      <dgm:prSet presAssocID="{F24B68E4-F207-4331-AB2E-874EF6376E5A}" presName="Name37" presStyleLbl="parChTrans1D2" presStyleIdx="1" presStyleCnt="3"/>
       <dgm:spPr/>
+      <dgm:t>
+        <a:bodyPr/>
+        <a:lstStyle/>
+        <a:p>
+          <a:endParaRPr lang="en-US"/>
+        </a:p>
+      </dgm:t>
     </dgm:pt>
     <dgm:pt modelId="{8359BC8A-F4E4-479E-BB7B-CDBBAD8A1571}" type="pres">
       <dgm:prSet presAssocID="{EE8A25CC-646E-4C3E-A390-0945F2BDB392}" presName="hierRoot2" presStyleCnt="0">
@@ -1152,14 +1196,54 @@
       <dgm:prSet presAssocID="{F79BF2BA-C12D-41F0-98AB-ECF0687C8930}" presName="hierChild3" presStyleCnt="0"/>
       <dgm:spPr/>
     </dgm:pt>
+    <dgm:pt modelId="{C79AFB63-2D6B-4461-B43C-E493C503F849}" type="pres">
+      <dgm:prSet presAssocID="{7696DB51-2E87-4A8F-9450-E2326826882E}" presName="Name111" presStyleLbl="parChTrans1D2" presStyleIdx="2" presStyleCnt="3"/>
+      <dgm:spPr/>
+    </dgm:pt>
+    <dgm:pt modelId="{AFDBE665-C6B0-4E12-9D51-B51C8E2251F0}" type="pres">
+      <dgm:prSet presAssocID="{37895DD0-92FC-468C-926C-0EBA4D248FBF}" presName="hierRoot3" presStyleCnt="0">
+        <dgm:presLayoutVars>
+          <dgm:hierBranch val="init"/>
+        </dgm:presLayoutVars>
+      </dgm:prSet>
+      <dgm:spPr/>
+    </dgm:pt>
+    <dgm:pt modelId="{250A7C24-E020-4E5D-B5F9-4FDD4B0ABE8F}" type="pres">
+      <dgm:prSet presAssocID="{37895DD0-92FC-468C-926C-0EBA4D248FBF}" presName="rootComposite3" presStyleCnt="0"/>
+      <dgm:spPr/>
+    </dgm:pt>
+    <dgm:pt modelId="{EB8A93A8-C030-4F83-AB3F-D144C98084E9}" type="pres">
+      <dgm:prSet presAssocID="{37895DD0-92FC-468C-926C-0EBA4D248FBF}" presName="rootText3" presStyleLbl="asst1" presStyleIdx="0" presStyleCnt="1">
+        <dgm:presLayoutVars>
+          <dgm:chPref val="3"/>
+        </dgm:presLayoutVars>
+      </dgm:prSet>
+      <dgm:spPr/>
+    </dgm:pt>
+    <dgm:pt modelId="{A80E3427-61D2-4950-9ACB-E9965E2C7348}" type="pres">
+      <dgm:prSet presAssocID="{37895DD0-92FC-468C-926C-0EBA4D248FBF}" presName="rootConnector3" presStyleLbl="asst1" presStyleIdx="0" presStyleCnt="1"/>
+      <dgm:spPr/>
+    </dgm:pt>
+    <dgm:pt modelId="{9E388F86-ED49-48C3-82A7-6C5AE070F900}" type="pres">
+      <dgm:prSet presAssocID="{37895DD0-92FC-468C-926C-0EBA4D248FBF}" presName="hierChild6" presStyleCnt="0"/>
+      <dgm:spPr/>
+    </dgm:pt>
+    <dgm:pt modelId="{C4E4F1FE-AEA1-4EAE-8517-18A823D736CD}" type="pres">
+      <dgm:prSet presAssocID="{37895DD0-92FC-468C-926C-0EBA4D248FBF}" presName="hierChild7" presStyleCnt="0"/>
+      <dgm:spPr/>
+    </dgm:pt>
   </dgm:ptLst>
   <dgm:cxnLst>
     <dgm:cxn modelId="{E80C2B05-DD61-472D-BB38-D1C42AC173C2}" type="presOf" srcId="{E91F32F3-B4D2-4874-B7C8-B38898C3429E}" destId="{1E6CC110-7E98-4D6E-866F-F1D76D73F529}" srcOrd="0" destOrd="0" presId="urn:microsoft.com/office/officeart/2005/8/layout/orgChart1"/>
     <dgm:cxn modelId="{D16D6771-BF0B-460F-BC67-271464CD097B}" type="presOf" srcId="{F79BF2BA-C12D-41F0-98AB-ECF0687C8930}" destId="{8C013EB3-B4D3-4529-902A-AD72844806A5}" srcOrd="1" destOrd="0" presId="urn:microsoft.com/office/officeart/2005/8/layout/orgChart1"/>
+    <dgm:cxn modelId="{57253361-678A-41D5-903F-6F8DD2AA84BE}" type="presOf" srcId="{37895DD0-92FC-468C-926C-0EBA4D248FBF}" destId="{EB8A93A8-C030-4F83-AB3F-D144C98084E9}" srcOrd="0" destOrd="0" presId="urn:microsoft.com/office/officeart/2005/8/layout/orgChart1"/>
+    <dgm:cxn modelId="{9CDE9DA6-D2D9-47DB-BF27-8D55C40A20F7}" type="presOf" srcId="{7696DB51-2E87-4A8F-9450-E2326826882E}" destId="{C79AFB63-2D6B-4461-B43C-E493C503F849}" srcOrd="0" destOrd="0" presId="urn:microsoft.com/office/officeart/2005/8/layout/orgChart1"/>
     <dgm:cxn modelId="{4961BDC5-724B-4CD5-B550-38AA49D4F23C}" srcId="{F79BF2BA-C12D-41F0-98AB-ECF0687C8930}" destId="{4C56CC9F-0CFC-4191-B98C-D01C5D04FD77}" srcOrd="0" destOrd="0" parTransId="{FD244A27-16C9-4184-91E5-921C7737C3A4}" sibTransId="{D8D65D54-A0CA-4F3D-BF9F-0D6998BAA758}"/>
+    <dgm:cxn modelId="{4A9392B6-4EE8-4F51-9CCF-0142051C091F}" srcId="{F79BF2BA-C12D-41F0-98AB-ECF0687C8930}" destId="{37895DD0-92FC-468C-926C-0EBA4D248FBF}" srcOrd="2" destOrd="0" parTransId="{7696DB51-2E87-4A8F-9450-E2326826882E}" sibTransId="{7E3F9848-0627-4D4E-A984-297C8EB004FF}"/>
+    <dgm:cxn modelId="{E0102997-4A3B-4928-B801-88550C537DC6}" type="presOf" srcId="{37895DD0-92FC-468C-926C-0EBA4D248FBF}" destId="{A80E3427-61D2-4950-9ACB-E9965E2C7348}" srcOrd="1" destOrd="0" presId="urn:microsoft.com/office/officeart/2005/8/layout/orgChart1"/>
     <dgm:cxn modelId="{4A761667-AD16-4924-8990-C26FEAF32E50}" type="presOf" srcId="{4C56CC9F-0CFC-4191-B98C-D01C5D04FD77}" destId="{8AF25BAC-ACA9-4D18-8F24-F17D21F7278E}" srcOrd="0" destOrd="0" presId="urn:microsoft.com/office/officeart/2005/8/layout/orgChart1"/>
+    <dgm:cxn modelId="{8B8316E3-C488-44AA-8207-C2C2F9C8D7E3}" type="presOf" srcId="{F79BF2BA-C12D-41F0-98AB-ECF0687C8930}" destId="{73D75FC9-4D0B-4F1C-9DAF-025710BC7780}" srcOrd="0" destOrd="0" presId="urn:microsoft.com/office/officeart/2005/8/layout/orgChart1"/>
     <dgm:cxn modelId="{27FA029E-098A-48CC-AD7B-327E28479C76}" type="presOf" srcId="{F24B68E4-F207-4331-AB2E-874EF6376E5A}" destId="{8FD8BB2B-E817-456B-BC2C-6ABA570D34B2}" srcOrd="0" destOrd="0" presId="urn:microsoft.com/office/officeart/2005/8/layout/orgChart1"/>
-    <dgm:cxn modelId="{8B8316E3-C488-44AA-8207-C2C2F9C8D7E3}" type="presOf" srcId="{F79BF2BA-C12D-41F0-98AB-ECF0687C8930}" destId="{73D75FC9-4D0B-4F1C-9DAF-025710BC7780}" srcOrd="0" destOrd="0" presId="urn:microsoft.com/office/officeart/2005/8/layout/orgChart1"/>
     <dgm:cxn modelId="{23955F49-FB11-4B92-B7A7-EED9CEEE5367}" srcId="{E91F32F3-B4D2-4874-B7C8-B38898C3429E}" destId="{F79BF2BA-C12D-41F0-98AB-ECF0687C8930}" srcOrd="0" destOrd="0" parTransId="{5C706A80-9F77-435D-9A81-12AE85E9301B}" sibTransId="{C96AB820-3048-4232-AAB2-0139EC082F34}"/>
     <dgm:cxn modelId="{A9FD64E2-868E-47A9-85B3-33D3CAD7C56A}" type="presOf" srcId="{EE8A25CC-646E-4C3E-A390-0945F2BDB392}" destId="{61D0F5EB-FA81-4C71-9EE2-9B02E7B657D0}" srcOrd="1" destOrd="0" presId="urn:microsoft.com/office/officeart/2005/8/layout/orgChart1"/>
     <dgm:cxn modelId="{B7BCE250-A52E-4969-8832-FCE7E074DA94}" type="presOf" srcId="{EE8A25CC-646E-4C3E-A390-0945F2BDB392}" destId="{3F56B7B4-3052-4B04-B64B-053E097390D2}" srcOrd="0" destOrd="0" presId="urn:microsoft.com/office/officeart/2005/8/layout/orgChart1"/>
@@ -1186,6 +1270,13 @@
     <dgm:cxn modelId="{C84B8199-AA92-4DF3-BE53-5B4049B2875E}" type="presParOf" srcId="{8359BC8A-F4E4-479E-BB7B-CDBBAD8A1571}" destId="{CC512F7B-0B78-43DE-A5DC-F70D378F3571}" srcOrd="1" destOrd="0" presId="urn:microsoft.com/office/officeart/2005/8/layout/orgChart1"/>
     <dgm:cxn modelId="{1B9A340F-A352-44C3-90CD-9F181CA4F930}" type="presParOf" srcId="{8359BC8A-F4E4-479E-BB7B-CDBBAD8A1571}" destId="{686F3B19-B76D-48BC-B83C-849E1E4EFD92}" srcOrd="2" destOrd="0" presId="urn:microsoft.com/office/officeart/2005/8/layout/orgChart1"/>
     <dgm:cxn modelId="{74C65238-4EF9-4BD6-90F4-72BE7F74FC01}" type="presParOf" srcId="{C035F02F-130B-4526-B8E1-EBEE23F5E756}" destId="{E3D4090F-A76A-4060-BA3B-7C835CB9379A}" srcOrd="2" destOrd="0" presId="urn:microsoft.com/office/officeart/2005/8/layout/orgChart1"/>
+    <dgm:cxn modelId="{9CC5488D-34B8-4E45-8D70-6C6F7CFC0F36}" type="presParOf" srcId="{E3D4090F-A76A-4060-BA3B-7C835CB9379A}" destId="{C79AFB63-2D6B-4461-B43C-E493C503F849}" srcOrd="0" destOrd="0" presId="urn:microsoft.com/office/officeart/2005/8/layout/orgChart1"/>
+    <dgm:cxn modelId="{D6B057EB-D00A-46F0-BDA6-2D20B5B8D6FE}" type="presParOf" srcId="{E3D4090F-A76A-4060-BA3B-7C835CB9379A}" destId="{AFDBE665-C6B0-4E12-9D51-B51C8E2251F0}" srcOrd="1" destOrd="0" presId="urn:microsoft.com/office/officeart/2005/8/layout/orgChart1"/>
+    <dgm:cxn modelId="{B65B346C-1785-4A55-A0A4-391A41B34B83}" type="presParOf" srcId="{AFDBE665-C6B0-4E12-9D51-B51C8E2251F0}" destId="{250A7C24-E020-4E5D-B5F9-4FDD4B0ABE8F}" srcOrd="0" destOrd="0" presId="urn:microsoft.com/office/officeart/2005/8/layout/orgChart1"/>
+    <dgm:cxn modelId="{526A0788-AA88-446B-AB06-DBB9969FCF3D}" type="presParOf" srcId="{250A7C24-E020-4E5D-B5F9-4FDD4B0ABE8F}" destId="{EB8A93A8-C030-4F83-AB3F-D144C98084E9}" srcOrd="0" destOrd="0" presId="urn:microsoft.com/office/officeart/2005/8/layout/orgChart1"/>
+    <dgm:cxn modelId="{FE5873C4-070A-4177-8276-B49D4387B84D}" type="presParOf" srcId="{250A7C24-E020-4E5D-B5F9-4FDD4B0ABE8F}" destId="{A80E3427-61D2-4950-9ACB-E9965E2C7348}" srcOrd="1" destOrd="0" presId="urn:microsoft.com/office/officeart/2005/8/layout/orgChart1"/>
+    <dgm:cxn modelId="{52492477-FFFB-4D8E-BCB7-2F3DE32EB672}" type="presParOf" srcId="{AFDBE665-C6B0-4E12-9D51-B51C8E2251F0}" destId="{9E388F86-ED49-48C3-82A7-6C5AE070F900}" srcOrd="1" destOrd="0" presId="urn:microsoft.com/office/officeart/2005/8/layout/orgChart1"/>
+    <dgm:cxn modelId="{3A91F885-D522-433C-A8D1-850385587930}" type="presParOf" srcId="{AFDBE665-C6B0-4E12-9D51-B51C8E2251F0}" destId="{C4E4F1FE-AEA1-4EAE-8517-18A823D736CD}" srcOrd="2" destOrd="0" presId="urn:microsoft.com/office/officeart/2005/8/layout/orgChart1"/>
   </dgm:cxnLst>
   <dgm:bg/>
   <dgm:whole/>
@@ -3570,7 +3661,7 @@
           <a:p>
             <a:fld id="{15E12F17-D344-4B5E-8FF6-E09E5B6DEAF0}" type="datetimeFigureOut">
               <a:rPr lang="en-US" smtClean="0"/>
-              <a:t>1/2/2019</a:t>
+              <a:t>1/9/2019</a:t>
             </a:fld>
             <a:endParaRPr lang="en-US"/>
           </a:p>
@@ -3740,7 +3831,7 @@
           <a:p>
             <a:fld id="{15E12F17-D344-4B5E-8FF6-E09E5B6DEAF0}" type="datetimeFigureOut">
               <a:rPr lang="en-US" smtClean="0"/>
-              <a:t>1/2/2019</a:t>
+              <a:t>1/9/2019</a:t>
             </a:fld>
             <a:endParaRPr lang="en-US"/>
           </a:p>
@@ -3920,7 +4011,7 @@
           <a:p>
             <a:fld id="{15E12F17-D344-4B5E-8FF6-E09E5B6DEAF0}" type="datetimeFigureOut">
               <a:rPr lang="en-US" smtClean="0"/>
-              <a:t>1/2/2019</a:t>
+              <a:t>1/9/2019</a:t>
             </a:fld>
             <a:endParaRPr lang="en-US"/>
           </a:p>
@@ -4090,7 +4181,7 @@
           <a:p>
             <a:fld id="{15E12F17-D344-4B5E-8FF6-E09E5B6DEAF0}" type="datetimeFigureOut">
               <a:rPr lang="en-US" smtClean="0"/>
-              <a:t>1/2/2019</a:t>
+              <a:t>1/9/2019</a:t>
             </a:fld>
             <a:endParaRPr lang="en-US"/>
           </a:p>
@@ -4336,7 +4427,7 @@
           <a:p>
             <a:fld id="{15E12F17-D344-4B5E-8FF6-E09E5B6DEAF0}" type="datetimeFigureOut">
               <a:rPr lang="en-US" smtClean="0"/>
-              <a:t>1/2/2019</a:t>
+              <a:t>1/9/2019</a:t>
             </a:fld>
             <a:endParaRPr lang="en-US"/>
           </a:p>
@@ -4624,7 +4715,7 @@
           <a:p>
             <a:fld id="{15E12F17-D344-4B5E-8FF6-E09E5B6DEAF0}" type="datetimeFigureOut">
               <a:rPr lang="en-US" smtClean="0"/>
-              <a:t>1/2/2019</a:t>
+              <a:t>1/9/2019</a:t>
             </a:fld>
             <a:endParaRPr lang="en-US"/>
           </a:p>
@@ -5046,7 +5137,7 @@
           <a:p>
             <a:fld id="{15E12F17-D344-4B5E-8FF6-E09E5B6DEAF0}" type="datetimeFigureOut">
               <a:rPr lang="en-US" smtClean="0"/>
-              <a:t>1/2/2019</a:t>
+              <a:t>1/9/2019</a:t>
             </a:fld>
             <a:endParaRPr lang="en-US"/>
           </a:p>
@@ -5164,7 +5255,7 @@
           <a:p>
             <a:fld id="{15E12F17-D344-4B5E-8FF6-E09E5B6DEAF0}" type="datetimeFigureOut">
               <a:rPr lang="en-US" smtClean="0"/>
-              <a:t>1/2/2019</a:t>
+              <a:t>1/9/2019</a:t>
             </a:fld>
             <a:endParaRPr lang="en-US"/>
           </a:p>
@@ -5259,7 +5350,7 @@
           <a:p>
             <a:fld id="{15E12F17-D344-4B5E-8FF6-E09E5B6DEAF0}" type="datetimeFigureOut">
               <a:rPr lang="en-US" smtClean="0"/>
-              <a:t>1/2/2019</a:t>
+              <a:t>1/9/2019</a:t>
             </a:fld>
             <a:endParaRPr lang="en-US"/>
           </a:p>
@@ -5536,7 +5627,7 @@
           <a:p>
             <a:fld id="{15E12F17-D344-4B5E-8FF6-E09E5B6DEAF0}" type="datetimeFigureOut">
               <a:rPr lang="en-US" smtClean="0"/>
-              <a:t>1/2/2019</a:t>
+              <a:t>1/9/2019</a:t>
             </a:fld>
             <a:endParaRPr lang="en-US"/>
           </a:p>
@@ -5789,7 +5880,7 @@
           <a:p>
             <a:fld id="{15E12F17-D344-4B5E-8FF6-E09E5B6DEAF0}" type="datetimeFigureOut">
               <a:rPr lang="en-US" smtClean="0"/>
-              <a:t>1/2/2019</a:t>
+              <a:t>1/9/2019</a:t>
             </a:fld>
             <a:endParaRPr lang="en-US"/>
           </a:p>
@@ -6002,7 +6093,7 @@
           <a:p>
             <a:fld id="{15E12F17-D344-4B5E-8FF6-E09E5B6DEAF0}" type="datetimeFigureOut">
               <a:rPr lang="en-US" smtClean="0"/>
-              <a:t>1/2/2019</a:t>
+              <a:t>1/9/2019</a:t>
             </a:fld>
             <a:endParaRPr lang="en-US"/>
           </a:p>
@@ -6384,7 +6475,7 @@
           <p:nvPr>
             <p:extLst>
               <p:ext uri="{D42A27DB-BD31-4B8C-83A1-F6EECF244321}">
-                <p14:modId xmlns:p14="http://schemas.microsoft.com/office/powerpoint/2010/main" val="2363260824"/>
+                <p14:modId xmlns:p14="http://schemas.microsoft.com/office/powerpoint/2010/main" val="2568224227"/>
               </p:ext>
             </p:extLst>
           </p:nvPr>

</xml_diff>

<commit_message>
oox smartart, org chart: handle multiple paragraphs on data node
This problem was similar to the one fixed in
2ee590f9eae5992af5137b6376b1ff820b4f6333 (oox smartart, accent process:
handle multiple runs from a data point, 2018-11-21), but this there we
handled multiple runs and this handles multiple paragraphs.

It seems some smartart types allow multiple paragraphs in a diagram
node, others only allow multiple runs. Org chart is in the former
category.

Change-Id: I281f01fdfa809d0a232d5da7fdaa23de7adcd627
Reviewed-on: https://gerrit.libreoffice.org/66066
Reviewed-by: Miklos Vajna <vmiklos@collabora.com>
Tested-by: Jenkins
</commit_message>
<xml_diff>
--- a/sd/qa/unit/data/pptx/smartart-org-chart.pptx
+++ b/sd/qa/unit/data/pptx/smartart-org-chart.pptx
@@ -878,6 +878,13 @@
           <a:r>
             <a:rPr lang="en-US" dirty="0" smtClean="0"/>
             <a:t>Manager</a:t>
+          </a:r>
+          <a:endParaRPr lang="en-US" dirty="0"/>
+        </a:p>
+        <a:p>
+          <a:r>
+            <a:rPr lang="en-US" dirty="0" smtClean="0"/>
+            <a:t>Second para</a:t>
           </a:r>
           <a:endParaRPr lang="en-US" dirty="0"/>
         </a:p>

</xml_diff>

<commit_message>
oox smartart, org chart: fix height of manager nodes without employees
Employees and/or assistants reduce the height of managers -- this effect
is wanted even if there are no employees/assistants.

Change-Id: I7bfcbf6819ee225aa2fbf21d4e064322912f8d5f
Reviewed-on: https://gerrit.libreoffice.org/66304
Reviewed-by: Miklos Vajna <vmiklos@collabora.com>
Tested-by: Jenkins
</commit_message>
<xml_diff>
--- a/sd/qa/unit/data/pptx/smartart-org-chart.pptx
+++ b/sd/qa/unit/data/pptx/smartart-org-chart.pptx
@@ -986,7 +986,44 @@
         </a:p>
       </dgm:t>
     </dgm:pt>
-    <dgm:pt modelId="{37895DD0-92FC-468C-926C-0EBA4D248FBF}" type="asst">
+    <dgm:pt modelId="{CD4A3225-006D-4542-B06E-2238A0DE6B7C}">
+      <dgm:prSet phldrT="[Text]"/>
+      <dgm:spPr/>
+      <dgm:t>
+        <a:bodyPr/>
+        <a:lstStyle/>
+        <a:p>
+          <a:r>
+            <a:rPr lang="en-US" dirty="0" smtClean="0"/>
+            <a:t>Manager2</a:t>
+          </a:r>
+          <a:endParaRPr lang="en-US" dirty="0"/>
+        </a:p>
+      </dgm:t>
+    </dgm:pt>
+    <dgm:pt modelId="{FF7A74B8-34FF-4356-9BA9-9E7408DE5F79}" type="parTrans" cxnId="{4B7FC525-321D-45C1-AFC6-FABC21317025}">
+      <dgm:prSet/>
+      <dgm:spPr/>
+      <dgm:t>
+        <a:bodyPr/>
+        <a:lstStyle/>
+        <a:p>
+          <a:endParaRPr lang="en-US"/>
+        </a:p>
+      </dgm:t>
+    </dgm:pt>
+    <dgm:pt modelId="{6B33B7A5-2385-4A27-B778-BEC5E47D1336}" type="sibTrans" cxnId="{4B7FC525-321D-45C1-AFC6-FABC21317025}">
+      <dgm:prSet/>
+      <dgm:spPr/>
+      <dgm:t>
+        <a:bodyPr/>
+        <a:lstStyle/>
+        <a:p>
+          <a:endParaRPr lang="en-US"/>
+        </a:p>
+      </dgm:t>
+    </dgm:pt>
+    <dgm:pt modelId="{819F243A-D3B6-4E91-AF5E-691A813F59DF}" type="asst">
       <dgm:prSet/>
       <dgm:spPr/>
       <dgm:t>
@@ -1001,7 +1038,7 @@
         </a:p>
       </dgm:t>
     </dgm:pt>
-    <dgm:pt modelId="{7696DB51-2E87-4A8F-9450-E2326826882E}" type="parTrans" cxnId="{4A9392B6-4EE8-4F51-9CCF-0142051C091F}">
+    <dgm:pt modelId="{B9790294-618D-4ECC-826B-E2885B40C713}" type="parTrans" cxnId="{06B29071-392B-455F-B6FE-4DD537670D27}">
       <dgm:prSet/>
       <dgm:spPr/>
       <dgm:t>
@@ -1012,7 +1049,7 @@
         </a:p>
       </dgm:t>
     </dgm:pt>
-    <dgm:pt modelId="{7E3F9848-0627-4D4E-A984-297C8EB004FF}" type="sibTrans" cxnId="{4A9392B6-4EE8-4F51-9CCF-0142051C091F}">
+    <dgm:pt modelId="{9F4B6A62-833D-410A-BFE0-0589AA9721C7}" type="sibTrans" cxnId="{06B29071-392B-455F-B6FE-4DD537670D27}">
       <dgm:prSet/>
       <dgm:spPr/>
       <dgm:t>
@@ -1056,7 +1093,7 @@
       <dgm:spPr/>
     </dgm:pt>
     <dgm:pt modelId="{73D75FC9-4D0B-4F1C-9DAF-025710BC7780}" type="pres">
-      <dgm:prSet presAssocID="{F79BF2BA-C12D-41F0-98AB-ECF0687C8930}" presName="rootText1" presStyleLbl="node0" presStyleIdx="0" presStyleCnt="1">
+      <dgm:prSet presAssocID="{F79BF2BA-C12D-41F0-98AB-ECF0687C8930}" presName="rootText1" presStyleLbl="node0" presStyleIdx="0" presStyleCnt="2">
         <dgm:presLayoutVars>
           <dgm:chPref val="3"/>
         </dgm:presLayoutVars>
@@ -1203,60 +1240,116 @@
       <dgm:prSet presAssocID="{F79BF2BA-C12D-41F0-98AB-ECF0687C8930}" presName="hierChild3" presStyleCnt="0"/>
       <dgm:spPr/>
     </dgm:pt>
-    <dgm:pt modelId="{C79AFB63-2D6B-4461-B43C-E493C503F849}" type="pres">
-      <dgm:prSet presAssocID="{7696DB51-2E87-4A8F-9450-E2326826882E}" presName="Name111" presStyleLbl="parChTrans1D2" presStyleIdx="2" presStyleCnt="3"/>
+    <dgm:pt modelId="{BD861EA9-311F-4CDB-BDFC-06992A3B2CA6}" type="pres">
+      <dgm:prSet presAssocID="{B9790294-618D-4ECC-826B-E2885B40C713}" presName="Name111" presStyleLbl="parChTrans1D2" presStyleIdx="2" presStyleCnt="3"/>
       <dgm:spPr/>
     </dgm:pt>
-    <dgm:pt modelId="{AFDBE665-C6B0-4E12-9D51-B51C8E2251F0}" type="pres">
-      <dgm:prSet presAssocID="{37895DD0-92FC-468C-926C-0EBA4D248FBF}" presName="hierRoot3" presStyleCnt="0">
+    <dgm:pt modelId="{3D92A9D3-EE65-4634-B6CE-C443A7448679}" type="pres">
+      <dgm:prSet presAssocID="{819F243A-D3B6-4E91-AF5E-691A813F59DF}" presName="hierRoot3" presStyleCnt="0">
         <dgm:presLayoutVars>
           <dgm:hierBranch val="init"/>
         </dgm:presLayoutVars>
       </dgm:prSet>
       <dgm:spPr/>
     </dgm:pt>
-    <dgm:pt modelId="{250A7C24-E020-4E5D-B5F9-4FDD4B0ABE8F}" type="pres">
-      <dgm:prSet presAssocID="{37895DD0-92FC-468C-926C-0EBA4D248FBF}" presName="rootComposite3" presStyleCnt="0"/>
+    <dgm:pt modelId="{CEAAE285-3B97-41C2-803E-C61198CF9104}" type="pres">
+      <dgm:prSet presAssocID="{819F243A-D3B6-4E91-AF5E-691A813F59DF}" presName="rootComposite3" presStyleCnt="0"/>
       <dgm:spPr/>
     </dgm:pt>
-    <dgm:pt modelId="{EB8A93A8-C030-4F83-AB3F-D144C98084E9}" type="pres">
-      <dgm:prSet presAssocID="{37895DD0-92FC-468C-926C-0EBA4D248FBF}" presName="rootText3" presStyleLbl="asst1" presStyleIdx="0" presStyleCnt="1">
+    <dgm:pt modelId="{326C18EF-807E-4A9E-BB0E-A3864A04107D}" type="pres">
+      <dgm:prSet presAssocID="{819F243A-D3B6-4E91-AF5E-691A813F59DF}" presName="rootText3" presStyleLbl="asst1" presStyleIdx="0" presStyleCnt="1">
         <dgm:presLayoutVars>
           <dgm:chPref val="3"/>
         </dgm:presLayoutVars>
       </dgm:prSet>
       <dgm:spPr/>
+      <dgm:t>
+        <a:bodyPr/>
+        <a:lstStyle/>
+        <a:p>
+          <a:endParaRPr lang="en-US"/>
+        </a:p>
+      </dgm:t>
     </dgm:pt>
-    <dgm:pt modelId="{A80E3427-61D2-4950-9ACB-E9965E2C7348}" type="pres">
-      <dgm:prSet presAssocID="{37895DD0-92FC-468C-926C-0EBA4D248FBF}" presName="rootConnector3" presStyleLbl="asst1" presStyleIdx="0" presStyleCnt="1"/>
+    <dgm:pt modelId="{9730236B-0AF5-4182-A2BF-F59EA51678B1}" type="pres">
+      <dgm:prSet presAssocID="{819F243A-D3B6-4E91-AF5E-691A813F59DF}" presName="rootConnector3" presStyleLbl="asst1" presStyleIdx="0" presStyleCnt="1"/>
       <dgm:spPr/>
     </dgm:pt>
-    <dgm:pt modelId="{9E388F86-ED49-48C3-82A7-6C5AE070F900}" type="pres">
-      <dgm:prSet presAssocID="{37895DD0-92FC-468C-926C-0EBA4D248FBF}" presName="hierChild6" presStyleCnt="0"/>
+    <dgm:pt modelId="{9393DBA6-F94F-4AC9-96BF-11A263832390}" type="pres">
+      <dgm:prSet presAssocID="{819F243A-D3B6-4E91-AF5E-691A813F59DF}" presName="hierChild6" presStyleCnt="0"/>
       <dgm:spPr/>
     </dgm:pt>
-    <dgm:pt modelId="{C4E4F1FE-AEA1-4EAE-8517-18A823D736CD}" type="pres">
-      <dgm:prSet presAssocID="{37895DD0-92FC-468C-926C-0EBA4D248FBF}" presName="hierChild7" presStyleCnt="0"/>
+    <dgm:pt modelId="{9AB49F9C-C601-4770-82E8-F69C15836211}" type="pres">
+      <dgm:prSet presAssocID="{819F243A-D3B6-4E91-AF5E-691A813F59DF}" presName="hierChild7" presStyleCnt="0"/>
+      <dgm:spPr/>
+    </dgm:pt>
+    <dgm:pt modelId="{5F759D41-7945-4121-8642-00D7D22F2DEA}" type="pres">
+      <dgm:prSet presAssocID="{CD4A3225-006D-4542-B06E-2238A0DE6B7C}" presName="hierRoot1" presStyleCnt="0">
+        <dgm:presLayoutVars>
+          <dgm:hierBranch val="init"/>
+        </dgm:presLayoutVars>
+      </dgm:prSet>
+      <dgm:spPr/>
+    </dgm:pt>
+    <dgm:pt modelId="{3D888A27-CE53-433A-A8FA-1284641F5181}" type="pres">
+      <dgm:prSet presAssocID="{CD4A3225-006D-4542-B06E-2238A0DE6B7C}" presName="rootComposite1" presStyleCnt="0"/>
+      <dgm:spPr/>
+    </dgm:pt>
+    <dgm:pt modelId="{BC4C0756-B432-4E51-AB1D-8A683B8825EC}" type="pres">
+      <dgm:prSet presAssocID="{CD4A3225-006D-4542-B06E-2238A0DE6B7C}" presName="rootText1" presStyleLbl="node0" presStyleIdx="1" presStyleCnt="2">
+        <dgm:presLayoutVars>
+          <dgm:chPref val="3"/>
+        </dgm:presLayoutVars>
+      </dgm:prSet>
+      <dgm:spPr/>
+      <dgm:t>
+        <a:bodyPr/>
+        <a:lstStyle/>
+        <a:p>
+          <a:endParaRPr lang="en-US"/>
+        </a:p>
+      </dgm:t>
+    </dgm:pt>
+    <dgm:pt modelId="{A188D21C-92E3-4AC1-BBBA-FA0498B84D73}" type="pres">
+      <dgm:prSet presAssocID="{CD4A3225-006D-4542-B06E-2238A0DE6B7C}" presName="rootConnector1" presStyleLbl="node1" presStyleIdx="0" presStyleCnt="0"/>
+      <dgm:spPr/>
+      <dgm:t>
+        <a:bodyPr/>
+        <a:lstStyle/>
+        <a:p>
+          <a:endParaRPr lang="en-US"/>
+        </a:p>
+      </dgm:t>
+    </dgm:pt>
+    <dgm:pt modelId="{90B109F8-ACDF-4BEE-AA81-BD41929EA23A}" type="pres">
+      <dgm:prSet presAssocID="{CD4A3225-006D-4542-B06E-2238A0DE6B7C}" presName="hierChild2" presStyleCnt="0"/>
+      <dgm:spPr/>
+    </dgm:pt>
+    <dgm:pt modelId="{F6A431E9-18B3-4238-BCC4-C3BCF38AFF76}" type="pres">
+      <dgm:prSet presAssocID="{CD4A3225-006D-4542-B06E-2238A0DE6B7C}" presName="hierChild3" presStyleCnt="0"/>
       <dgm:spPr/>
     </dgm:pt>
   </dgm:ptLst>
   <dgm:cxnLst>
+    <dgm:cxn modelId="{06B29071-392B-455F-B6FE-4DD537670D27}" srcId="{F79BF2BA-C12D-41F0-98AB-ECF0687C8930}" destId="{819F243A-D3B6-4E91-AF5E-691A813F59DF}" srcOrd="2" destOrd="0" parTransId="{B9790294-618D-4ECC-826B-E2885B40C713}" sibTransId="{9F4B6A62-833D-410A-BFE0-0589AA9721C7}"/>
+    <dgm:cxn modelId="{4A761667-AD16-4924-8990-C26FEAF32E50}" type="presOf" srcId="{4C56CC9F-0CFC-4191-B98C-D01C5D04FD77}" destId="{8AF25BAC-ACA9-4D18-8F24-F17D21F7278E}" srcOrd="0" destOrd="0" presId="urn:microsoft.com/office/officeart/2005/8/layout/orgChart1"/>
+    <dgm:cxn modelId="{5455AA16-A42E-4F1E-B42B-2BCD519F7C5D}" type="presOf" srcId="{FD244A27-16C9-4184-91E5-921C7737C3A4}" destId="{888DEA80-633D-4A41-962C-40328E175584}" srcOrd="0" destOrd="0" presId="urn:microsoft.com/office/officeart/2005/8/layout/orgChart1"/>
+    <dgm:cxn modelId="{B7BCE250-A52E-4969-8832-FCE7E074DA94}" type="presOf" srcId="{EE8A25CC-646E-4C3E-A390-0945F2BDB392}" destId="{3F56B7B4-3052-4B04-B64B-053E097390D2}" srcOrd="0" destOrd="0" presId="urn:microsoft.com/office/officeart/2005/8/layout/orgChart1"/>
+    <dgm:cxn modelId="{A9FD64E2-868E-47A9-85B3-33D3CAD7C56A}" type="presOf" srcId="{EE8A25CC-646E-4C3E-A390-0945F2BDB392}" destId="{61D0F5EB-FA81-4C71-9EE2-9B02E7B657D0}" srcOrd="1" destOrd="0" presId="urn:microsoft.com/office/officeart/2005/8/layout/orgChart1"/>
+    <dgm:cxn modelId="{679FF0E5-5728-4825-AFB3-24178B5E5703}" type="presOf" srcId="{819F243A-D3B6-4E91-AF5E-691A813F59DF}" destId="{326C18EF-807E-4A9E-BB0E-A3864A04107D}" srcOrd="0" destOrd="0" presId="urn:microsoft.com/office/officeart/2005/8/layout/orgChart1"/>
+    <dgm:cxn modelId="{4961BDC5-724B-4CD5-B550-38AA49D4F23C}" srcId="{F79BF2BA-C12D-41F0-98AB-ECF0687C8930}" destId="{4C56CC9F-0CFC-4191-B98C-D01C5D04FD77}" srcOrd="0" destOrd="0" parTransId="{FD244A27-16C9-4184-91E5-921C7737C3A4}" sibTransId="{D8D65D54-A0CA-4F3D-BF9F-0D6998BAA758}"/>
+    <dgm:cxn modelId="{7D12767F-1F85-4A68-A5EA-692214E31832}" srcId="{F79BF2BA-C12D-41F0-98AB-ECF0687C8930}" destId="{EE8A25CC-646E-4C3E-A390-0945F2BDB392}" srcOrd="1" destOrd="0" parTransId="{F24B68E4-F207-4331-AB2E-874EF6376E5A}" sibTransId="{C0963BE2-9AA3-4137-9EAC-5EB96AB269CB}"/>
+    <dgm:cxn modelId="{23955F49-FB11-4B92-B7A7-EED9CEEE5367}" srcId="{E91F32F3-B4D2-4874-B7C8-B38898C3429E}" destId="{F79BF2BA-C12D-41F0-98AB-ECF0687C8930}" srcOrd="0" destOrd="0" parTransId="{5C706A80-9F77-435D-9A81-12AE85E9301B}" sibTransId="{C96AB820-3048-4232-AAB2-0139EC082F34}"/>
+    <dgm:cxn modelId="{27FA029E-098A-48CC-AD7B-327E28479C76}" type="presOf" srcId="{F24B68E4-F207-4331-AB2E-874EF6376E5A}" destId="{8FD8BB2B-E817-456B-BC2C-6ABA570D34B2}" srcOrd="0" destOrd="0" presId="urn:microsoft.com/office/officeart/2005/8/layout/orgChart1"/>
+    <dgm:cxn modelId="{9CDB1EAE-2D18-4952-A1B7-D53E05CE64A9}" type="presOf" srcId="{B9790294-618D-4ECC-826B-E2885B40C713}" destId="{BD861EA9-311F-4CDB-BDFC-06992A3B2CA6}" srcOrd="0" destOrd="0" presId="urn:microsoft.com/office/officeart/2005/8/layout/orgChart1"/>
+    <dgm:cxn modelId="{69145F54-5A4D-493E-A4FE-C96742CE171F}" type="presOf" srcId="{4C56CC9F-0CFC-4191-B98C-D01C5D04FD77}" destId="{4A9BCEEC-BFD4-44F8-A47B-C443FDAFA94F}" srcOrd="1" destOrd="0" presId="urn:microsoft.com/office/officeart/2005/8/layout/orgChart1"/>
+    <dgm:cxn modelId="{EE8A69F6-6A4A-47D5-BB35-5C052CC255FE}" type="presOf" srcId="{819F243A-D3B6-4E91-AF5E-691A813F59DF}" destId="{9730236B-0AF5-4182-A2BF-F59EA51678B1}" srcOrd="1" destOrd="0" presId="urn:microsoft.com/office/officeart/2005/8/layout/orgChart1"/>
     <dgm:cxn modelId="{E80C2B05-DD61-472D-BB38-D1C42AC173C2}" type="presOf" srcId="{E91F32F3-B4D2-4874-B7C8-B38898C3429E}" destId="{1E6CC110-7E98-4D6E-866F-F1D76D73F529}" srcOrd="0" destOrd="0" presId="urn:microsoft.com/office/officeart/2005/8/layout/orgChart1"/>
     <dgm:cxn modelId="{D16D6771-BF0B-460F-BC67-271464CD097B}" type="presOf" srcId="{F79BF2BA-C12D-41F0-98AB-ECF0687C8930}" destId="{8C013EB3-B4D3-4529-902A-AD72844806A5}" srcOrd="1" destOrd="0" presId="urn:microsoft.com/office/officeart/2005/8/layout/orgChart1"/>
-    <dgm:cxn modelId="{57253361-678A-41D5-903F-6F8DD2AA84BE}" type="presOf" srcId="{37895DD0-92FC-468C-926C-0EBA4D248FBF}" destId="{EB8A93A8-C030-4F83-AB3F-D144C98084E9}" srcOrd="0" destOrd="0" presId="urn:microsoft.com/office/officeart/2005/8/layout/orgChart1"/>
-    <dgm:cxn modelId="{9CDE9DA6-D2D9-47DB-BF27-8D55C40A20F7}" type="presOf" srcId="{7696DB51-2E87-4A8F-9450-E2326826882E}" destId="{C79AFB63-2D6B-4461-B43C-E493C503F849}" srcOrd="0" destOrd="0" presId="urn:microsoft.com/office/officeart/2005/8/layout/orgChart1"/>
-    <dgm:cxn modelId="{4961BDC5-724B-4CD5-B550-38AA49D4F23C}" srcId="{F79BF2BA-C12D-41F0-98AB-ECF0687C8930}" destId="{4C56CC9F-0CFC-4191-B98C-D01C5D04FD77}" srcOrd="0" destOrd="0" parTransId="{FD244A27-16C9-4184-91E5-921C7737C3A4}" sibTransId="{D8D65D54-A0CA-4F3D-BF9F-0D6998BAA758}"/>
-    <dgm:cxn modelId="{4A9392B6-4EE8-4F51-9CCF-0142051C091F}" srcId="{F79BF2BA-C12D-41F0-98AB-ECF0687C8930}" destId="{37895DD0-92FC-468C-926C-0EBA4D248FBF}" srcOrd="2" destOrd="0" parTransId="{7696DB51-2E87-4A8F-9450-E2326826882E}" sibTransId="{7E3F9848-0627-4D4E-A984-297C8EB004FF}"/>
-    <dgm:cxn modelId="{E0102997-4A3B-4928-B801-88550C537DC6}" type="presOf" srcId="{37895DD0-92FC-468C-926C-0EBA4D248FBF}" destId="{A80E3427-61D2-4950-9ACB-E9965E2C7348}" srcOrd="1" destOrd="0" presId="urn:microsoft.com/office/officeart/2005/8/layout/orgChart1"/>
-    <dgm:cxn modelId="{4A761667-AD16-4924-8990-C26FEAF32E50}" type="presOf" srcId="{4C56CC9F-0CFC-4191-B98C-D01C5D04FD77}" destId="{8AF25BAC-ACA9-4D18-8F24-F17D21F7278E}" srcOrd="0" destOrd="0" presId="urn:microsoft.com/office/officeart/2005/8/layout/orgChart1"/>
+    <dgm:cxn modelId="{23687972-105A-4C36-9370-9DB2055BE075}" type="presOf" srcId="{CD4A3225-006D-4542-B06E-2238A0DE6B7C}" destId="{BC4C0756-B432-4E51-AB1D-8A683B8825EC}" srcOrd="0" destOrd="0" presId="urn:microsoft.com/office/officeart/2005/8/layout/orgChart1"/>
+    <dgm:cxn modelId="{58CEC936-0E42-4D4A-A7AC-7C2853F5E9CE}" type="presOf" srcId="{CD4A3225-006D-4542-B06E-2238A0DE6B7C}" destId="{A188D21C-92E3-4AC1-BBBA-FA0498B84D73}" srcOrd="1" destOrd="0" presId="urn:microsoft.com/office/officeart/2005/8/layout/orgChart1"/>
     <dgm:cxn modelId="{8B8316E3-C488-44AA-8207-C2C2F9C8D7E3}" type="presOf" srcId="{F79BF2BA-C12D-41F0-98AB-ECF0687C8930}" destId="{73D75FC9-4D0B-4F1C-9DAF-025710BC7780}" srcOrd="0" destOrd="0" presId="urn:microsoft.com/office/officeart/2005/8/layout/orgChart1"/>
-    <dgm:cxn modelId="{27FA029E-098A-48CC-AD7B-327E28479C76}" type="presOf" srcId="{F24B68E4-F207-4331-AB2E-874EF6376E5A}" destId="{8FD8BB2B-E817-456B-BC2C-6ABA570D34B2}" srcOrd="0" destOrd="0" presId="urn:microsoft.com/office/officeart/2005/8/layout/orgChart1"/>
-    <dgm:cxn modelId="{23955F49-FB11-4B92-B7A7-EED9CEEE5367}" srcId="{E91F32F3-B4D2-4874-B7C8-B38898C3429E}" destId="{F79BF2BA-C12D-41F0-98AB-ECF0687C8930}" srcOrd="0" destOrd="0" parTransId="{5C706A80-9F77-435D-9A81-12AE85E9301B}" sibTransId="{C96AB820-3048-4232-AAB2-0139EC082F34}"/>
-    <dgm:cxn modelId="{A9FD64E2-868E-47A9-85B3-33D3CAD7C56A}" type="presOf" srcId="{EE8A25CC-646E-4C3E-A390-0945F2BDB392}" destId="{61D0F5EB-FA81-4C71-9EE2-9B02E7B657D0}" srcOrd="1" destOrd="0" presId="urn:microsoft.com/office/officeart/2005/8/layout/orgChart1"/>
-    <dgm:cxn modelId="{B7BCE250-A52E-4969-8832-FCE7E074DA94}" type="presOf" srcId="{EE8A25CC-646E-4C3E-A390-0945F2BDB392}" destId="{3F56B7B4-3052-4B04-B64B-053E097390D2}" srcOrd="0" destOrd="0" presId="urn:microsoft.com/office/officeart/2005/8/layout/orgChart1"/>
-    <dgm:cxn modelId="{69145F54-5A4D-493E-A4FE-C96742CE171F}" type="presOf" srcId="{4C56CC9F-0CFC-4191-B98C-D01C5D04FD77}" destId="{4A9BCEEC-BFD4-44F8-A47B-C443FDAFA94F}" srcOrd="1" destOrd="0" presId="urn:microsoft.com/office/officeart/2005/8/layout/orgChart1"/>
-    <dgm:cxn modelId="{5455AA16-A42E-4F1E-B42B-2BCD519F7C5D}" type="presOf" srcId="{FD244A27-16C9-4184-91E5-921C7737C3A4}" destId="{888DEA80-633D-4A41-962C-40328E175584}" srcOrd="0" destOrd="0" presId="urn:microsoft.com/office/officeart/2005/8/layout/orgChart1"/>
-    <dgm:cxn modelId="{7D12767F-1F85-4A68-A5EA-692214E31832}" srcId="{F79BF2BA-C12D-41F0-98AB-ECF0687C8930}" destId="{EE8A25CC-646E-4C3E-A390-0945F2BDB392}" srcOrd="1" destOrd="0" parTransId="{F24B68E4-F207-4331-AB2E-874EF6376E5A}" sibTransId="{C0963BE2-9AA3-4137-9EAC-5EB96AB269CB}"/>
+    <dgm:cxn modelId="{4B7FC525-321D-45C1-AFC6-FABC21317025}" srcId="{E91F32F3-B4D2-4874-B7C8-B38898C3429E}" destId="{CD4A3225-006D-4542-B06E-2238A0DE6B7C}" srcOrd="1" destOrd="0" parTransId="{FF7A74B8-34FF-4356-9BA9-9E7408DE5F79}" sibTransId="{6B33B7A5-2385-4A27-B778-BEC5E47D1336}"/>
     <dgm:cxn modelId="{E46154BD-36B9-4EA4-893D-2FFA45E2C50D}" type="presParOf" srcId="{1E6CC110-7E98-4D6E-866F-F1D76D73F529}" destId="{C035F02F-130B-4526-B8E1-EBEE23F5E756}" srcOrd="0" destOrd="0" presId="urn:microsoft.com/office/officeart/2005/8/layout/orgChart1"/>
     <dgm:cxn modelId="{2104D806-AB15-467F-965D-8AD0128ECCB0}" type="presParOf" srcId="{C035F02F-130B-4526-B8E1-EBEE23F5E756}" destId="{47BE8FF0-8C79-4F27-B3E2-1AA358354832}" srcOrd="0" destOrd="0" presId="urn:microsoft.com/office/officeart/2005/8/layout/orgChart1"/>
     <dgm:cxn modelId="{BE951806-9A6E-42E2-BA02-15FE7B420B92}" type="presParOf" srcId="{47BE8FF0-8C79-4F27-B3E2-1AA358354832}" destId="{73D75FC9-4D0B-4F1C-9DAF-025710BC7780}" srcOrd="0" destOrd="0" presId="urn:microsoft.com/office/officeart/2005/8/layout/orgChart1"/>
@@ -1277,13 +1370,19 @@
     <dgm:cxn modelId="{C84B8199-AA92-4DF3-BE53-5B4049B2875E}" type="presParOf" srcId="{8359BC8A-F4E4-479E-BB7B-CDBBAD8A1571}" destId="{CC512F7B-0B78-43DE-A5DC-F70D378F3571}" srcOrd="1" destOrd="0" presId="urn:microsoft.com/office/officeart/2005/8/layout/orgChart1"/>
     <dgm:cxn modelId="{1B9A340F-A352-44C3-90CD-9F181CA4F930}" type="presParOf" srcId="{8359BC8A-F4E4-479E-BB7B-CDBBAD8A1571}" destId="{686F3B19-B76D-48BC-B83C-849E1E4EFD92}" srcOrd="2" destOrd="0" presId="urn:microsoft.com/office/officeart/2005/8/layout/orgChart1"/>
     <dgm:cxn modelId="{74C65238-4EF9-4BD6-90F4-72BE7F74FC01}" type="presParOf" srcId="{C035F02F-130B-4526-B8E1-EBEE23F5E756}" destId="{E3D4090F-A76A-4060-BA3B-7C835CB9379A}" srcOrd="2" destOrd="0" presId="urn:microsoft.com/office/officeart/2005/8/layout/orgChart1"/>
-    <dgm:cxn modelId="{9CC5488D-34B8-4E45-8D70-6C6F7CFC0F36}" type="presParOf" srcId="{E3D4090F-A76A-4060-BA3B-7C835CB9379A}" destId="{C79AFB63-2D6B-4461-B43C-E493C503F849}" srcOrd="0" destOrd="0" presId="urn:microsoft.com/office/officeart/2005/8/layout/orgChart1"/>
-    <dgm:cxn modelId="{D6B057EB-D00A-46F0-BDA6-2D20B5B8D6FE}" type="presParOf" srcId="{E3D4090F-A76A-4060-BA3B-7C835CB9379A}" destId="{AFDBE665-C6B0-4E12-9D51-B51C8E2251F0}" srcOrd="1" destOrd="0" presId="urn:microsoft.com/office/officeart/2005/8/layout/orgChart1"/>
-    <dgm:cxn modelId="{B65B346C-1785-4A55-A0A4-391A41B34B83}" type="presParOf" srcId="{AFDBE665-C6B0-4E12-9D51-B51C8E2251F0}" destId="{250A7C24-E020-4E5D-B5F9-4FDD4B0ABE8F}" srcOrd="0" destOrd="0" presId="urn:microsoft.com/office/officeart/2005/8/layout/orgChart1"/>
-    <dgm:cxn modelId="{526A0788-AA88-446B-AB06-DBB9969FCF3D}" type="presParOf" srcId="{250A7C24-E020-4E5D-B5F9-4FDD4B0ABE8F}" destId="{EB8A93A8-C030-4F83-AB3F-D144C98084E9}" srcOrd="0" destOrd="0" presId="urn:microsoft.com/office/officeart/2005/8/layout/orgChart1"/>
-    <dgm:cxn modelId="{FE5873C4-070A-4177-8276-B49D4387B84D}" type="presParOf" srcId="{250A7C24-E020-4E5D-B5F9-4FDD4B0ABE8F}" destId="{A80E3427-61D2-4950-9ACB-E9965E2C7348}" srcOrd="1" destOrd="0" presId="urn:microsoft.com/office/officeart/2005/8/layout/orgChart1"/>
-    <dgm:cxn modelId="{52492477-FFFB-4D8E-BCB7-2F3DE32EB672}" type="presParOf" srcId="{AFDBE665-C6B0-4E12-9D51-B51C8E2251F0}" destId="{9E388F86-ED49-48C3-82A7-6C5AE070F900}" srcOrd="1" destOrd="0" presId="urn:microsoft.com/office/officeart/2005/8/layout/orgChart1"/>
-    <dgm:cxn modelId="{3A91F885-D522-433C-A8D1-850385587930}" type="presParOf" srcId="{AFDBE665-C6B0-4E12-9D51-B51C8E2251F0}" destId="{C4E4F1FE-AEA1-4EAE-8517-18A823D736CD}" srcOrd="2" destOrd="0" presId="urn:microsoft.com/office/officeart/2005/8/layout/orgChart1"/>
+    <dgm:cxn modelId="{5DB138BA-DCD4-4670-89FB-8CCC983337FE}" type="presParOf" srcId="{E3D4090F-A76A-4060-BA3B-7C835CB9379A}" destId="{BD861EA9-311F-4CDB-BDFC-06992A3B2CA6}" srcOrd="0" destOrd="0" presId="urn:microsoft.com/office/officeart/2005/8/layout/orgChart1"/>
+    <dgm:cxn modelId="{F20782C2-95BA-4883-88BE-766B7085DD87}" type="presParOf" srcId="{E3D4090F-A76A-4060-BA3B-7C835CB9379A}" destId="{3D92A9D3-EE65-4634-B6CE-C443A7448679}" srcOrd="1" destOrd="0" presId="urn:microsoft.com/office/officeart/2005/8/layout/orgChart1"/>
+    <dgm:cxn modelId="{C7D8A415-0A72-4BFA-A08B-44FA3FEE273D}" type="presParOf" srcId="{3D92A9D3-EE65-4634-B6CE-C443A7448679}" destId="{CEAAE285-3B97-41C2-803E-C61198CF9104}" srcOrd="0" destOrd="0" presId="urn:microsoft.com/office/officeart/2005/8/layout/orgChart1"/>
+    <dgm:cxn modelId="{ABF75353-3827-458A-B355-4EBE9A94FB39}" type="presParOf" srcId="{CEAAE285-3B97-41C2-803E-C61198CF9104}" destId="{326C18EF-807E-4A9E-BB0E-A3864A04107D}" srcOrd="0" destOrd="0" presId="urn:microsoft.com/office/officeart/2005/8/layout/orgChart1"/>
+    <dgm:cxn modelId="{B32B44D6-A019-455D-8D1C-315BCA89BFF0}" type="presParOf" srcId="{CEAAE285-3B97-41C2-803E-C61198CF9104}" destId="{9730236B-0AF5-4182-A2BF-F59EA51678B1}" srcOrd="1" destOrd="0" presId="urn:microsoft.com/office/officeart/2005/8/layout/orgChart1"/>
+    <dgm:cxn modelId="{5A19BCC9-7B6C-42B9-969B-66090F6D7321}" type="presParOf" srcId="{3D92A9D3-EE65-4634-B6CE-C443A7448679}" destId="{9393DBA6-F94F-4AC9-96BF-11A263832390}" srcOrd="1" destOrd="0" presId="urn:microsoft.com/office/officeart/2005/8/layout/orgChart1"/>
+    <dgm:cxn modelId="{930A3914-2FA3-48F4-8189-FD6B43E9DEB9}" type="presParOf" srcId="{3D92A9D3-EE65-4634-B6CE-C443A7448679}" destId="{9AB49F9C-C601-4770-82E8-F69C15836211}" srcOrd="2" destOrd="0" presId="urn:microsoft.com/office/officeart/2005/8/layout/orgChart1"/>
+    <dgm:cxn modelId="{23F5DDB2-DA17-4E9A-B5C3-6C13F1699E7B}" type="presParOf" srcId="{1E6CC110-7E98-4D6E-866F-F1D76D73F529}" destId="{5F759D41-7945-4121-8642-00D7D22F2DEA}" srcOrd="1" destOrd="0" presId="urn:microsoft.com/office/officeart/2005/8/layout/orgChart1"/>
+    <dgm:cxn modelId="{83B342C4-C759-44C4-A9AA-90C3B4ADC36B}" type="presParOf" srcId="{5F759D41-7945-4121-8642-00D7D22F2DEA}" destId="{3D888A27-CE53-433A-A8FA-1284641F5181}" srcOrd="0" destOrd="0" presId="urn:microsoft.com/office/officeart/2005/8/layout/orgChart1"/>
+    <dgm:cxn modelId="{C6AEDC3F-17FE-4B70-856F-162552C79E9D}" type="presParOf" srcId="{3D888A27-CE53-433A-A8FA-1284641F5181}" destId="{BC4C0756-B432-4E51-AB1D-8A683B8825EC}" srcOrd="0" destOrd="0" presId="urn:microsoft.com/office/officeart/2005/8/layout/orgChart1"/>
+    <dgm:cxn modelId="{DACF0F5D-1015-44D7-B453-4CF04E5119FF}" type="presParOf" srcId="{3D888A27-CE53-433A-A8FA-1284641F5181}" destId="{A188D21C-92E3-4AC1-BBBA-FA0498B84D73}" srcOrd="1" destOrd="0" presId="urn:microsoft.com/office/officeart/2005/8/layout/orgChart1"/>
+    <dgm:cxn modelId="{622D8E73-B3BB-4BD8-A8BB-54A735D30B4F}" type="presParOf" srcId="{5F759D41-7945-4121-8642-00D7D22F2DEA}" destId="{90B109F8-ACDF-4BEE-AA81-BD41929EA23A}" srcOrd="1" destOrd="0" presId="urn:microsoft.com/office/officeart/2005/8/layout/orgChart1"/>
+    <dgm:cxn modelId="{D91C377E-51B1-4B0F-B271-4506A7C68DB5}" type="presParOf" srcId="{5F759D41-7945-4121-8642-00D7D22F2DEA}" destId="{F6A431E9-18B3-4238-BCC4-C3BCF38AFF76}" srcOrd="2" destOrd="0" presId="urn:microsoft.com/office/officeart/2005/8/layout/orgChart1"/>
   </dgm:cxnLst>
   <dgm:bg/>
   <dgm:whole/>
@@ -3668,7 +3767,7 @@
           <a:p>
             <a:fld id="{15E12F17-D344-4B5E-8FF6-E09E5B6DEAF0}" type="datetimeFigureOut">
               <a:rPr lang="en-US" smtClean="0"/>
-              <a:t>1/9/2019</a:t>
+              <a:t>1/14/2019</a:t>
             </a:fld>
             <a:endParaRPr lang="en-US"/>
           </a:p>
@@ -3838,7 +3937,7 @@
           <a:p>
             <a:fld id="{15E12F17-D344-4B5E-8FF6-E09E5B6DEAF0}" type="datetimeFigureOut">
               <a:rPr lang="en-US" smtClean="0"/>
-              <a:t>1/9/2019</a:t>
+              <a:t>1/14/2019</a:t>
             </a:fld>
             <a:endParaRPr lang="en-US"/>
           </a:p>
@@ -4018,7 +4117,7 @@
           <a:p>
             <a:fld id="{15E12F17-D344-4B5E-8FF6-E09E5B6DEAF0}" type="datetimeFigureOut">
               <a:rPr lang="en-US" smtClean="0"/>
-              <a:t>1/9/2019</a:t>
+              <a:t>1/14/2019</a:t>
             </a:fld>
             <a:endParaRPr lang="en-US"/>
           </a:p>
@@ -4188,7 +4287,7 @@
           <a:p>
             <a:fld id="{15E12F17-D344-4B5E-8FF6-E09E5B6DEAF0}" type="datetimeFigureOut">
               <a:rPr lang="en-US" smtClean="0"/>
-              <a:t>1/9/2019</a:t>
+              <a:t>1/14/2019</a:t>
             </a:fld>
             <a:endParaRPr lang="en-US"/>
           </a:p>
@@ -4434,7 +4533,7 @@
           <a:p>
             <a:fld id="{15E12F17-D344-4B5E-8FF6-E09E5B6DEAF0}" type="datetimeFigureOut">
               <a:rPr lang="en-US" smtClean="0"/>
-              <a:t>1/9/2019</a:t>
+              <a:t>1/14/2019</a:t>
             </a:fld>
             <a:endParaRPr lang="en-US"/>
           </a:p>
@@ -4722,7 +4821,7 @@
           <a:p>
             <a:fld id="{15E12F17-D344-4B5E-8FF6-E09E5B6DEAF0}" type="datetimeFigureOut">
               <a:rPr lang="en-US" smtClean="0"/>
-              <a:t>1/9/2019</a:t>
+              <a:t>1/14/2019</a:t>
             </a:fld>
             <a:endParaRPr lang="en-US"/>
           </a:p>
@@ -5144,7 +5243,7 @@
           <a:p>
             <a:fld id="{15E12F17-D344-4B5E-8FF6-E09E5B6DEAF0}" type="datetimeFigureOut">
               <a:rPr lang="en-US" smtClean="0"/>
-              <a:t>1/9/2019</a:t>
+              <a:t>1/14/2019</a:t>
             </a:fld>
             <a:endParaRPr lang="en-US"/>
           </a:p>
@@ -5262,7 +5361,7 @@
           <a:p>
             <a:fld id="{15E12F17-D344-4B5E-8FF6-E09E5B6DEAF0}" type="datetimeFigureOut">
               <a:rPr lang="en-US" smtClean="0"/>
-              <a:t>1/9/2019</a:t>
+              <a:t>1/14/2019</a:t>
             </a:fld>
             <a:endParaRPr lang="en-US"/>
           </a:p>
@@ -5357,7 +5456,7 @@
           <a:p>
             <a:fld id="{15E12F17-D344-4B5E-8FF6-E09E5B6DEAF0}" type="datetimeFigureOut">
               <a:rPr lang="en-US" smtClean="0"/>
-              <a:t>1/9/2019</a:t>
+              <a:t>1/14/2019</a:t>
             </a:fld>
             <a:endParaRPr lang="en-US"/>
           </a:p>
@@ -5634,7 +5733,7 @@
           <a:p>
             <a:fld id="{15E12F17-D344-4B5E-8FF6-E09E5B6DEAF0}" type="datetimeFigureOut">
               <a:rPr lang="en-US" smtClean="0"/>
-              <a:t>1/9/2019</a:t>
+              <a:t>1/14/2019</a:t>
             </a:fld>
             <a:endParaRPr lang="en-US"/>
           </a:p>
@@ -5887,7 +5986,7 @@
           <a:p>
             <a:fld id="{15E12F17-D344-4B5E-8FF6-E09E5B6DEAF0}" type="datetimeFigureOut">
               <a:rPr lang="en-US" smtClean="0"/>
-              <a:t>1/9/2019</a:t>
+              <a:t>1/14/2019</a:t>
             </a:fld>
             <a:endParaRPr lang="en-US"/>
           </a:p>
@@ -6100,7 +6199,7 @@
           <a:p>
             <a:fld id="{15E12F17-D344-4B5E-8FF6-E09E5B6DEAF0}" type="datetimeFigureOut">
               <a:rPr lang="en-US" smtClean="0"/>
-              <a:t>1/9/2019</a:t>
+              <a:t>1/14/2019</a:t>
             </a:fld>
             <a:endParaRPr lang="en-US"/>
           </a:p>
@@ -6482,7 +6581,7 @@
           <p:nvPr>
             <p:extLst>
               <p:ext uri="{D42A27DB-BD31-4B8C-83A1-F6EECF244321}">
-                <p14:modId xmlns:p14="http://schemas.microsoft.com/office/powerpoint/2010/main" val="2568224227"/>
+                <p14:modId xmlns:p14="http://schemas.microsoft.com/office/powerpoint/2010/main" val="4063117179"/>
               </p:ext>
             </p:extLst>
           </p:nvPr>

</xml_diff>